<commit_message>
Updated to better explain setup steps
</commit_message>
<xml_diff>
--- a/PIISearch.pptx
+++ b/PIISearch.pptx
@@ -6,8 +6,8 @@
   </p:sldMasterIdLst>
   <p:sldIdLst>
     <p:sldId id="256" r:id="rId2"/>
-    <p:sldId id="260" r:id="rId3"/>
-    <p:sldId id="257" r:id="rId4"/>
+    <p:sldId id="257" r:id="rId3"/>
+    <p:sldId id="260" r:id="rId4"/>
     <p:sldId id="258" r:id="rId5"/>
     <p:sldId id="259" r:id="rId6"/>
   </p:sldIdLst>
@@ -247,7 +247,7 @@
           <a:p>
             <a:fld id="{B6465EB7-F460-4903-BF57-8D5E44E712F2}" type="datetimeFigureOut">
               <a:rPr lang="en-US" smtClean="0"/>
-              <a:t>8/10/2021</a:t>
+              <a:t>8/13/2021</a:t>
             </a:fld>
             <a:endParaRPr lang="en-US"/>
           </a:p>
@@ -417,7 +417,7 @@
           <a:p>
             <a:fld id="{B6465EB7-F460-4903-BF57-8D5E44E712F2}" type="datetimeFigureOut">
               <a:rPr lang="en-US" smtClean="0"/>
-              <a:t>8/10/2021</a:t>
+              <a:t>8/13/2021</a:t>
             </a:fld>
             <a:endParaRPr lang="en-US"/>
           </a:p>
@@ -597,7 +597,7 @@
           <a:p>
             <a:fld id="{B6465EB7-F460-4903-BF57-8D5E44E712F2}" type="datetimeFigureOut">
               <a:rPr lang="en-US" smtClean="0"/>
-              <a:t>8/10/2021</a:t>
+              <a:t>8/13/2021</a:t>
             </a:fld>
             <a:endParaRPr lang="en-US"/>
           </a:p>
@@ -767,7 +767,7 @@
           <a:p>
             <a:fld id="{B6465EB7-F460-4903-BF57-8D5E44E712F2}" type="datetimeFigureOut">
               <a:rPr lang="en-US" smtClean="0"/>
-              <a:t>8/10/2021</a:t>
+              <a:t>8/13/2021</a:t>
             </a:fld>
             <a:endParaRPr lang="en-US"/>
           </a:p>
@@ -1013,7 +1013,7 @@
           <a:p>
             <a:fld id="{B6465EB7-F460-4903-BF57-8D5E44E712F2}" type="datetimeFigureOut">
               <a:rPr lang="en-US" smtClean="0"/>
-              <a:t>8/10/2021</a:t>
+              <a:t>8/13/2021</a:t>
             </a:fld>
             <a:endParaRPr lang="en-US"/>
           </a:p>
@@ -1245,7 +1245,7 @@
           <a:p>
             <a:fld id="{B6465EB7-F460-4903-BF57-8D5E44E712F2}" type="datetimeFigureOut">
               <a:rPr lang="en-US" smtClean="0"/>
-              <a:t>8/10/2021</a:t>
+              <a:t>8/13/2021</a:t>
             </a:fld>
             <a:endParaRPr lang="en-US"/>
           </a:p>
@@ -1612,7 +1612,7 @@
           <a:p>
             <a:fld id="{B6465EB7-F460-4903-BF57-8D5E44E712F2}" type="datetimeFigureOut">
               <a:rPr lang="en-US" smtClean="0"/>
-              <a:t>8/10/2021</a:t>
+              <a:t>8/13/2021</a:t>
             </a:fld>
             <a:endParaRPr lang="en-US"/>
           </a:p>
@@ -1730,7 +1730,7 @@
           <a:p>
             <a:fld id="{B6465EB7-F460-4903-BF57-8D5E44E712F2}" type="datetimeFigureOut">
               <a:rPr lang="en-US" smtClean="0"/>
-              <a:t>8/10/2021</a:t>
+              <a:t>8/13/2021</a:t>
             </a:fld>
             <a:endParaRPr lang="en-US"/>
           </a:p>
@@ -1825,7 +1825,7 @@
           <a:p>
             <a:fld id="{B6465EB7-F460-4903-BF57-8D5E44E712F2}" type="datetimeFigureOut">
               <a:rPr lang="en-US" smtClean="0"/>
-              <a:t>8/10/2021</a:t>
+              <a:t>8/13/2021</a:t>
             </a:fld>
             <a:endParaRPr lang="en-US"/>
           </a:p>
@@ -2102,7 +2102,7 @@
           <a:p>
             <a:fld id="{B6465EB7-F460-4903-BF57-8D5E44E712F2}" type="datetimeFigureOut">
               <a:rPr lang="en-US" smtClean="0"/>
-              <a:t>8/10/2021</a:t>
+              <a:t>8/13/2021</a:t>
             </a:fld>
             <a:endParaRPr lang="en-US"/>
           </a:p>
@@ -2355,7 +2355,7 @@
           <a:p>
             <a:fld id="{B6465EB7-F460-4903-BF57-8D5E44E712F2}" type="datetimeFigureOut">
               <a:rPr lang="en-US" smtClean="0"/>
-              <a:t>8/10/2021</a:t>
+              <a:t>8/13/2021</a:t>
             </a:fld>
             <a:endParaRPr lang="en-US"/>
           </a:p>
@@ -2568,7 +2568,7 @@
           <a:p>
             <a:fld id="{B6465EB7-F460-4903-BF57-8D5E44E712F2}" type="datetimeFigureOut">
               <a:rPr lang="en-US" smtClean="0"/>
-              <a:t>8/10/2021</a:t>
+              <a:t>8/13/2021</a:t>
             </a:fld>
             <a:endParaRPr lang="en-US"/>
           </a:p>
@@ -2983,16 +2983,21 @@
             <p:ph type="ctrTitle"/>
           </p:nvPr>
         </p:nvSpPr>
-        <p:spPr/>
+        <p:spPr>
+          <a:xfrm>
+            <a:off x="1630325" y="1605515"/>
+            <a:ext cx="9144000" cy="1043210"/>
+          </a:xfrm>
+        </p:spPr>
         <p:txBody>
           <a:bodyPr/>
           <a:lstStyle/>
           <a:p>
             <a:r>
-              <a:rPr lang="en-US" dirty="0" smtClean="0"/>
+              <a:rPr lang="en-US" b="1" dirty="0" smtClean="0"/>
               <a:t>PII Search Project</a:t>
             </a:r>
-            <a:endParaRPr lang="en-US" dirty="0"/>
+            <a:endParaRPr lang="en-US" b="1" dirty="0"/>
           </a:p>
         </p:txBody>
       </p:sp>
@@ -3006,7 +3011,12 @@
             <p:ph type="subTitle" idx="1"/>
           </p:nvPr>
         </p:nvSpPr>
-        <p:spPr/>
+        <p:spPr>
+          <a:xfrm>
+            <a:off x="1534633" y="2648725"/>
+            <a:ext cx="9144000" cy="445349"/>
+          </a:xfrm>
+        </p:spPr>
         <p:txBody>
           <a:bodyPr/>
           <a:lstStyle/>
@@ -3037,137 +3047,6 @@
 </file>
 
 <file path=ppt/slides/slide2.xml><?xml version="1.0" encoding="utf-8"?>
-<p:sld xmlns:a="http://schemas.openxmlformats.org/drawingml/2006/main" xmlns:r="http://schemas.openxmlformats.org/officeDocument/2006/relationships" xmlns:p="http://schemas.openxmlformats.org/presentationml/2006/main">
-  <p:cSld>
-    <p:spTree>
-      <p:nvGrpSpPr>
-        <p:cNvPr id="1" name=""/>
-        <p:cNvGrpSpPr/>
-        <p:nvPr/>
-      </p:nvGrpSpPr>
-      <p:grpSpPr>
-        <a:xfrm>
-          <a:off x="0" y="0"/>
-          <a:ext cx="0" cy="0"/>
-          <a:chOff x="0" y="0"/>
-          <a:chExt cx="0" cy="0"/>
-        </a:xfrm>
-      </p:grpSpPr>
-      <p:sp>
-        <p:nvSpPr>
-          <p:cNvPr id="2" name="Title 1"/>
-          <p:cNvSpPr>
-            <a:spLocks noGrp="1"/>
-          </p:cNvSpPr>
-          <p:nvPr>
-            <p:ph type="title"/>
-          </p:nvPr>
-        </p:nvSpPr>
-        <p:spPr/>
-        <p:txBody>
-          <a:bodyPr/>
-          <a:lstStyle/>
-          <a:p>
-            <a:r>
-              <a:rPr lang="en-US" dirty="0" smtClean="0"/>
-              <a:t>NOTE</a:t>
-            </a:r>
-            <a:endParaRPr lang="en-US" dirty="0"/>
-          </a:p>
-        </p:txBody>
-      </p:sp>
-      <p:sp>
-        <p:nvSpPr>
-          <p:cNvPr id="3" name="Content Placeholder 2"/>
-          <p:cNvSpPr>
-            <a:spLocks noGrp="1"/>
-          </p:cNvSpPr>
-          <p:nvPr>
-            <p:ph idx="1"/>
-          </p:nvPr>
-        </p:nvSpPr>
-        <p:spPr/>
-        <p:txBody>
-          <a:bodyPr/>
-          <a:lstStyle/>
-          <a:p>
-            <a:r>
-              <a:rPr lang="en-US" dirty="0" smtClean="0"/>
-              <a:t>The Script PII Search.html and Main_orig.html will need to be modified before use. You must change the variable </a:t>
-            </a:r>
-            <a:r>
-              <a:rPr lang="en-US" dirty="0" err="1" smtClean="0"/>
-              <a:t>masterURL</a:t>
-            </a:r>
-            <a:r>
-              <a:rPr lang="en-US" dirty="0" smtClean="0"/>
-              <a:t> to point to the relative location/site where you want all the data to be stored. </a:t>
-            </a:r>
-          </a:p>
-          <a:p>
-            <a:endParaRPr lang="en-US" dirty="0" smtClean="0"/>
-          </a:p>
-          <a:p>
-            <a:endParaRPr lang="en-US" dirty="0" smtClean="0"/>
-          </a:p>
-          <a:p>
-            <a:endParaRPr lang="en-US" dirty="0"/>
-          </a:p>
-          <a:p>
-            <a:r>
-              <a:rPr lang="en-US" dirty="0" smtClean="0"/>
-              <a:t>-it is the relative path, but before any site page (so it wont end in .</a:t>
-            </a:r>
-            <a:r>
-              <a:rPr lang="en-US" dirty="0" err="1" smtClean="0"/>
-              <a:t>aspx</a:t>
-            </a:r>
-            <a:r>
-              <a:rPr lang="en-US" dirty="0" smtClean="0"/>
-              <a:t>), and does not include the https://etc...</a:t>
-            </a:r>
-            <a:endParaRPr lang="en-US" dirty="0"/>
-          </a:p>
-        </p:txBody>
-      </p:sp>
-      <p:pic>
-        <p:nvPicPr>
-          <p:cNvPr id="4" name="Picture 3"/>
-          <p:cNvPicPr>
-            <a:picLocks noChangeAspect="1"/>
-          </p:cNvPicPr>
-          <p:nvPr/>
-        </p:nvPicPr>
-        <p:blipFill>
-          <a:blip r:embed="rId2"/>
-          <a:stretch>
-            <a:fillRect/>
-          </a:stretch>
-        </p:blipFill>
-        <p:spPr>
-          <a:xfrm>
-            <a:off x="1069321" y="4001294"/>
-            <a:ext cx="8601075" cy="238125"/>
-          </a:xfrm>
-          <a:prstGeom prst="rect">
-            <a:avLst/>
-          </a:prstGeom>
-        </p:spPr>
-      </p:pic>
-    </p:spTree>
-    <p:extLst>
-      <p:ext uri="{BB962C8B-B14F-4D97-AF65-F5344CB8AC3E}">
-        <p14:creationId xmlns:p14="http://schemas.microsoft.com/office/powerpoint/2010/main" val="1913385688"/>
-      </p:ext>
-    </p:extLst>
-  </p:cSld>
-  <p:clrMapOvr>
-    <a:masterClrMapping/>
-  </p:clrMapOvr>
-</p:sld>
-</file>
-
-<file path=ppt/slides/slide3.xml><?xml version="1.0" encoding="utf-8"?>
 <p:sld xmlns:a="http://schemas.openxmlformats.org/drawingml/2006/main" xmlns:r="http://schemas.openxmlformats.org/officeDocument/2006/relationships" xmlns:p="http://schemas.openxmlformats.org/presentationml/2006/main">
   <p:cSld>
     <p:spTree>
@@ -4408,6 +4287,144 @@
 </p:sld>
 </file>
 
+<file path=ppt/slides/slide3.xml><?xml version="1.0" encoding="utf-8"?>
+<p:sld xmlns:a="http://schemas.openxmlformats.org/drawingml/2006/main" xmlns:r="http://schemas.openxmlformats.org/officeDocument/2006/relationships" xmlns:p="http://schemas.openxmlformats.org/presentationml/2006/main">
+  <p:cSld>
+    <p:spTree>
+      <p:nvGrpSpPr>
+        <p:cNvPr id="1" name=""/>
+        <p:cNvGrpSpPr/>
+        <p:nvPr/>
+      </p:nvGrpSpPr>
+      <p:grpSpPr>
+        <a:xfrm>
+          <a:off x="0" y="0"/>
+          <a:ext cx="0" cy="0"/>
+          <a:chOff x="0" y="0"/>
+          <a:chExt cx="0" cy="0"/>
+        </a:xfrm>
+      </p:grpSpPr>
+      <p:sp>
+        <p:nvSpPr>
+          <p:cNvPr id="3" name="Content Placeholder 2"/>
+          <p:cNvSpPr>
+            <a:spLocks noGrp="1"/>
+          </p:cNvSpPr>
+          <p:nvPr>
+            <p:ph idx="1"/>
+          </p:nvPr>
+        </p:nvSpPr>
+        <p:spPr/>
+        <p:txBody>
+          <a:bodyPr/>
+          <a:lstStyle/>
+          <a:p>
+            <a:r>
+              <a:rPr lang="en-US" dirty="0" smtClean="0"/>
+              <a:t>The Script PII Search.html and Main_orig.html will need to be modified before use. You must change the variable </a:t>
+            </a:r>
+            <a:r>
+              <a:rPr lang="en-US" dirty="0" err="1" smtClean="0"/>
+              <a:t>masterURL</a:t>
+            </a:r>
+            <a:r>
+              <a:rPr lang="en-US" dirty="0" smtClean="0"/>
+              <a:t> to point to the relative location/site where you want all the data to be stored. </a:t>
+            </a:r>
+          </a:p>
+          <a:p>
+            <a:endParaRPr lang="en-US" dirty="0" smtClean="0"/>
+          </a:p>
+          <a:p>
+            <a:endParaRPr lang="en-US" dirty="0" smtClean="0"/>
+          </a:p>
+          <a:p>
+            <a:endParaRPr lang="en-US" dirty="0"/>
+          </a:p>
+          <a:p>
+            <a:r>
+              <a:rPr lang="en-US" dirty="0" smtClean="0"/>
+              <a:t>-it is the relative path, but before any site page (so it wont end in .</a:t>
+            </a:r>
+            <a:r>
+              <a:rPr lang="en-US" dirty="0" err="1" smtClean="0"/>
+              <a:t>aspx</a:t>
+            </a:r>
+            <a:r>
+              <a:rPr lang="en-US" dirty="0" smtClean="0"/>
+              <a:t>), and does not include the https://etc...</a:t>
+            </a:r>
+            <a:endParaRPr lang="en-US" dirty="0"/>
+          </a:p>
+        </p:txBody>
+      </p:sp>
+      <p:pic>
+        <p:nvPicPr>
+          <p:cNvPr id="4" name="Picture 3"/>
+          <p:cNvPicPr>
+            <a:picLocks noChangeAspect="1"/>
+          </p:cNvPicPr>
+          <p:nvPr/>
+        </p:nvPicPr>
+        <p:blipFill>
+          <a:blip r:embed="rId2"/>
+          <a:stretch>
+            <a:fillRect/>
+          </a:stretch>
+        </p:blipFill>
+        <p:spPr>
+          <a:xfrm>
+            <a:off x="1069321" y="4001294"/>
+            <a:ext cx="8601075" cy="238125"/>
+          </a:xfrm>
+          <a:prstGeom prst="rect">
+            <a:avLst/>
+          </a:prstGeom>
+        </p:spPr>
+      </p:pic>
+      <p:sp>
+        <p:nvSpPr>
+          <p:cNvPr id="6" name="TextBox 5"/>
+          <p:cNvSpPr txBox="1"/>
+          <p:nvPr/>
+        </p:nvSpPr>
+        <p:spPr>
+          <a:xfrm>
+            <a:off x="4979406" y="72427"/>
+            <a:ext cx="1286955" cy="369332"/>
+          </a:xfrm>
+          <a:prstGeom prst="rect">
+            <a:avLst/>
+          </a:prstGeom>
+          <a:noFill/>
+        </p:spPr>
+        <p:txBody>
+          <a:bodyPr wrap="none" rtlCol="0">
+            <a:spAutoFit/>
+          </a:bodyPr>
+          <a:lstStyle/>
+          <a:p>
+            <a:r>
+              <a:rPr lang="en-US" dirty="0" smtClean="0"/>
+              <a:t>How To Use</a:t>
+            </a:r>
+            <a:endParaRPr lang="en-US" dirty="0"/>
+          </a:p>
+        </p:txBody>
+      </p:sp>
+    </p:spTree>
+    <p:extLst>
+      <p:ext uri="{BB962C8B-B14F-4D97-AF65-F5344CB8AC3E}">
+        <p14:creationId xmlns:p14="http://schemas.microsoft.com/office/powerpoint/2010/main" val="1913385688"/>
+      </p:ext>
+    </p:extLst>
+  </p:cSld>
+  <p:clrMapOvr>
+    <a:masterClrMapping/>
+  </p:clrMapOvr>
+</p:sld>
+</file>
+
 <file path=ppt/slides/slide4.xml><?xml version="1.0" encoding="utf-8"?>
 <p:sld xmlns:a="http://schemas.openxmlformats.org/drawingml/2006/main" xmlns:r="http://schemas.openxmlformats.org/officeDocument/2006/relationships" xmlns:p="http://schemas.openxmlformats.org/presentationml/2006/main">
   <p:cSld>
@@ -4434,7 +4451,7 @@
         <p:spPr>
           <a:xfrm>
             <a:off x="4979406" y="72427"/>
-            <a:ext cx="1286955" cy="369332"/>
+            <a:ext cx="1707519" cy="369332"/>
           </a:xfrm>
           <a:prstGeom prst="rect">
             <a:avLst/>
@@ -4449,7 +4466,19 @@
           <a:p>
             <a:r>
               <a:rPr lang="en-US" dirty="0" smtClean="0"/>
-              <a:t>How To Use</a:t>
+              <a:t>How To </a:t>
+            </a:r>
+            <a:r>
+              <a:rPr lang="en-US" dirty="0" smtClean="0"/>
+              <a:t>Use </a:t>
+            </a:r>
+            <a:r>
+              <a:rPr lang="en-US" dirty="0" err="1" smtClean="0"/>
+              <a:t>pt</a:t>
+            </a:r>
+            <a:r>
+              <a:rPr lang="en-US" dirty="0" smtClean="0"/>
+              <a:t> 2</a:t>
             </a:r>
             <a:endParaRPr lang="en-US" dirty="0"/>
           </a:p>
@@ -5092,7 +5121,11 @@
             </a:r>
             <a:r>
               <a:rPr lang="en-US" dirty="0" smtClean="0"/>
-              <a:t> 2</a:t>
+              <a:t> </a:t>
+            </a:r>
+            <a:r>
+              <a:rPr lang="en-US" dirty="0" smtClean="0"/>
+              <a:t>3</a:t>
             </a:r>
             <a:endParaRPr lang="en-US" dirty="0"/>
           </a:p>

</xml_diff>